<commit_message>
Updated to latest jutils.
</commit_message>
<xml_diff>
--- a/java/Chatterbox/docs/ChatterboxUI.pptx
+++ b/java/Chatterbox/docs/ChatterboxUI.pptx
@@ -106,6 +106,11 @@
       </a:defRPr>
     </a:lvl9pPr>
   </p:defaultTextStyle>
+  <p:extLst>
+    <p:ext uri="{EFAFB233-063F-42B5-8137-9DF3F51BA10A}">
+      <p15:sldGuideLst xmlns:p15="http://schemas.microsoft.com/office/powerpoint/2012/main"/>
+    </p:ext>
+  </p:extLst>
 </p:presentation>
 </file>
 
@@ -240,7 +245,7 @@
           <a:p>
             <a:fld id="{C27607EC-C83C-4BF5-B0B9-9FB698618770}" type="datetimeFigureOut">
               <a:rPr lang="en-US" smtClean="0"/>
-              <a:t>3/2/2017</a:t>
+              <a:t>12/17/2019</a:t>
             </a:fld>
             <a:endParaRPr lang="en-US"/>
           </a:p>
@@ -410,7 +415,7 @@
           <a:p>
             <a:fld id="{C27607EC-C83C-4BF5-B0B9-9FB698618770}" type="datetimeFigureOut">
               <a:rPr lang="en-US" smtClean="0"/>
-              <a:t>3/2/2017</a:t>
+              <a:t>12/17/2019</a:t>
             </a:fld>
             <a:endParaRPr lang="en-US"/>
           </a:p>
@@ -590,7 +595,7 @@
           <a:p>
             <a:fld id="{C27607EC-C83C-4BF5-B0B9-9FB698618770}" type="datetimeFigureOut">
               <a:rPr lang="en-US" smtClean="0"/>
-              <a:t>3/2/2017</a:t>
+              <a:t>12/17/2019</a:t>
             </a:fld>
             <a:endParaRPr lang="en-US"/>
           </a:p>
@@ -760,7 +765,7 @@
           <a:p>
             <a:fld id="{C27607EC-C83C-4BF5-B0B9-9FB698618770}" type="datetimeFigureOut">
               <a:rPr lang="en-US" smtClean="0"/>
-              <a:t>3/2/2017</a:t>
+              <a:t>12/17/2019</a:t>
             </a:fld>
             <a:endParaRPr lang="en-US"/>
           </a:p>
@@ -1004,7 +1009,7 @@
           <a:p>
             <a:fld id="{C27607EC-C83C-4BF5-B0B9-9FB698618770}" type="datetimeFigureOut">
               <a:rPr lang="en-US" smtClean="0"/>
-              <a:t>3/2/2017</a:t>
+              <a:t>12/17/2019</a:t>
             </a:fld>
             <a:endParaRPr lang="en-US"/>
           </a:p>
@@ -1236,7 +1241,7 @@
           <a:p>
             <a:fld id="{C27607EC-C83C-4BF5-B0B9-9FB698618770}" type="datetimeFigureOut">
               <a:rPr lang="en-US" smtClean="0"/>
-              <a:t>3/2/2017</a:t>
+              <a:t>12/17/2019</a:t>
             </a:fld>
             <a:endParaRPr lang="en-US"/>
           </a:p>
@@ -1603,7 +1608,7 @@
           <a:p>
             <a:fld id="{C27607EC-C83C-4BF5-B0B9-9FB698618770}" type="datetimeFigureOut">
               <a:rPr lang="en-US" smtClean="0"/>
-              <a:t>3/2/2017</a:t>
+              <a:t>12/17/2019</a:t>
             </a:fld>
             <a:endParaRPr lang="en-US"/>
           </a:p>
@@ -1730,7 +1735,7 @@
           <a:p>
             <a:fld id="{C27607EC-C83C-4BF5-B0B9-9FB698618770}" type="datetimeFigureOut">
               <a:rPr lang="en-US" smtClean="0"/>
-              <a:t>3/2/2017</a:t>
+              <a:t>12/17/2019</a:t>
             </a:fld>
             <a:endParaRPr lang="en-US"/>
           </a:p>
@@ -1825,7 +1830,7 @@
           <a:p>
             <a:fld id="{C27607EC-C83C-4BF5-B0B9-9FB698618770}" type="datetimeFigureOut">
               <a:rPr lang="en-US" smtClean="0"/>
-              <a:t>3/2/2017</a:t>
+              <a:t>12/17/2019</a:t>
             </a:fld>
             <a:endParaRPr lang="en-US"/>
           </a:p>
@@ -2102,7 +2107,7 @@
           <a:p>
             <a:fld id="{C27607EC-C83C-4BF5-B0B9-9FB698618770}" type="datetimeFigureOut">
               <a:rPr lang="en-US" smtClean="0"/>
-              <a:t>3/2/2017</a:t>
+              <a:t>12/17/2019</a:t>
             </a:fld>
             <a:endParaRPr lang="en-US"/>
           </a:p>
@@ -2359,7 +2364,7 @@
           <a:p>
             <a:fld id="{C27607EC-C83C-4BF5-B0B9-9FB698618770}" type="datetimeFigureOut">
               <a:rPr lang="en-US" smtClean="0"/>
-              <a:t>3/2/2017</a:t>
+              <a:t>12/17/2019</a:t>
             </a:fld>
             <a:endParaRPr lang="en-US"/>
           </a:p>
@@ -2572,7 +2577,7 @@
           <a:p>
             <a:fld id="{C27607EC-C83C-4BF5-B0B9-9FB698618770}" type="datetimeFigureOut">
               <a:rPr lang="en-US" smtClean="0"/>
-              <a:t>3/2/2017</a:t>
+              <a:t>12/17/2019</a:t>
             </a:fld>
             <a:endParaRPr lang="en-US"/>
           </a:p>
@@ -4179,16 +4184,22 @@
       </p:sp>
       <p:grpSp>
         <p:nvGrpSpPr>
-          <p:cNvPr id="18" name="Group 17"/>
+          <p:cNvPr id="2" name="Group 1">
+            <a:extLst>
+              <a:ext uri="{FF2B5EF4-FFF2-40B4-BE49-F238E27FC236}">
+                <a16:creationId xmlns:a16="http://schemas.microsoft.com/office/drawing/2014/main" id="{950519CE-431B-42B6-8BA3-5D367D7F1656}"/>
+              </a:ext>
+            </a:extLst>
+          </p:cNvPr>
           <p:cNvGrpSpPr/>
           <p:nvPr/>
         </p:nvGrpSpPr>
         <p:grpSpPr>
           <a:xfrm>
-            <a:off x="2436873" y="2695574"/>
-            <a:ext cx="4279777" cy="2657475"/>
-            <a:chOff x="1759072" y="1800224"/>
-            <a:chExt cx="4279777" cy="2657475"/>
+            <a:off x="2432111" y="2268854"/>
+            <a:ext cx="4279777" cy="3165295"/>
+            <a:chOff x="2436873" y="2695574"/>
+            <a:chExt cx="4279777" cy="3165295"/>
           </a:xfrm>
         </p:grpSpPr>
         <p:sp>
@@ -4199,8 +4210,8 @@
           </p:nvSpPr>
           <p:spPr>
             <a:xfrm>
-              <a:off x="1759072" y="1800224"/>
-              <a:ext cx="4279777" cy="2657475"/>
+              <a:off x="2436873" y="2695574"/>
+              <a:ext cx="4279777" cy="3165295"/>
             </a:xfrm>
             <a:prstGeom prst="rect">
               <a:avLst/>
@@ -4264,7 +4275,7 @@
           </p:nvSpPr>
           <p:spPr>
             <a:xfrm>
-              <a:off x="3286124" y="1962149"/>
+              <a:off x="3963925" y="2857499"/>
               <a:ext cx="2581275" cy="361951"/>
             </a:xfrm>
             <a:prstGeom prst="rect">
@@ -4331,7 +4342,7 @@
           </p:nvSpPr>
           <p:spPr>
             <a:xfrm>
-              <a:off x="1759072" y="1947088"/>
+              <a:off x="2436873" y="2842438"/>
               <a:ext cx="1527048" cy="369332"/>
             </a:xfrm>
             <a:prstGeom prst="rect">
@@ -4361,7 +4372,7 @@
           </p:nvSpPr>
           <p:spPr>
             <a:xfrm>
-              <a:off x="3286123" y="2453758"/>
+              <a:off x="3963924" y="3349108"/>
               <a:ext cx="2581275" cy="361951"/>
             </a:xfrm>
             <a:prstGeom prst="rect">
@@ -4428,7 +4439,7 @@
           </p:nvSpPr>
           <p:spPr>
             <a:xfrm>
-              <a:off x="1759072" y="2431018"/>
+              <a:off x="2436873" y="3326368"/>
               <a:ext cx="1527048" cy="369332"/>
             </a:xfrm>
             <a:prstGeom prst="rect">
@@ -4458,7 +4469,7 @@
           </p:nvSpPr>
           <p:spPr>
             <a:xfrm>
-              <a:off x="1761758" y="2921853"/>
+              <a:off x="2439559" y="3817203"/>
               <a:ext cx="1527048" cy="369332"/>
             </a:xfrm>
             <a:prstGeom prst="rect">
@@ -4488,7 +4499,7 @@
           </p:nvSpPr>
           <p:spPr>
             <a:xfrm>
-              <a:off x="3286122" y="2945367"/>
+              <a:off x="3963923" y="3840717"/>
               <a:ext cx="2581275" cy="361951"/>
             </a:xfrm>
             <a:prstGeom prst="rect">
@@ -4555,7 +4566,7 @@
           </p:nvSpPr>
           <p:spPr>
             <a:xfrm>
-              <a:off x="3286120" y="3440368"/>
+              <a:off x="3970957" y="4840543"/>
               <a:ext cx="2581275" cy="361951"/>
             </a:xfrm>
             <a:prstGeom prst="rect">
@@ -4622,7 +4633,7 @@
           </p:nvSpPr>
           <p:spPr>
             <a:xfrm>
-              <a:off x="1759072" y="3428611"/>
+              <a:off x="2443909" y="4828786"/>
               <a:ext cx="1527048" cy="369332"/>
             </a:xfrm>
             <a:prstGeom prst="rect">
@@ -4652,7 +4663,7 @@
           </p:nvSpPr>
           <p:spPr>
             <a:xfrm>
-              <a:off x="3286120" y="3935369"/>
+              <a:off x="3970957" y="5335544"/>
               <a:ext cx="2581275" cy="361951"/>
             </a:xfrm>
             <a:prstGeom prst="rect">
@@ -4719,7 +4730,7 @@
           </p:nvSpPr>
           <p:spPr>
             <a:xfrm>
-              <a:off x="1759072" y="3927039"/>
+              <a:off x="2443909" y="5327214"/>
               <a:ext cx="1527048" cy="369332"/>
             </a:xfrm>
             <a:prstGeom prst="rect">
@@ -4738,6 +4749,115 @@
                 <a:rPr lang="en-US" dirty="0"/>
                 <a:t>Last Seen:</a:t>
               </a:r>
+            </a:p>
+          </p:txBody>
+        </p:sp>
+        <p:sp>
+          <p:nvSpPr>
+            <p:cNvPr id="19" name="TextBox 18">
+              <a:extLst>
+                <a:ext uri="{FF2B5EF4-FFF2-40B4-BE49-F238E27FC236}">
+                  <a16:creationId xmlns:a16="http://schemas.microsoft.com/office/drawing/2014/main" id="{08970DD2-675C-4142-8E3E-ED175B111800}"/>
+                </a:ext>
+              </a:extLst>
+            </p:cNvPr>
+            <p:cNvSpPr txBox="1"/>
+            <p:nvPr/>
+          </p:nvSpPr>
+          <p:spPr>
+            <a:xfrm>
+              <a:off x="2443909" y="4317939"/>
+              <a:ext cx="1527048" cy="369332"/>
+            </a:xfrm>
+            <a:prstGeom prst="rect">
+              <a:avLst/>
+            </a:prstGeom>
+            <a:noFill/>
+          </p:spPr>
+          <p:txBody>
+            <a:bodyPr wrap="none" rtlCol="0">
+              <a:noAutofit/>
+            </a:bodyPr>
+            <a:lstStyle/>
+            <a:p>
+              <a:pPr algn="r"/>
+              <a:r>
+                <a:rPr lang="en-US" dirty="0"/>
+                <a:t>Status:</a:t>
+              </a:r>
+            </a:p>
+          </p:txBody>
+        </p:sp>
+        <p:sp>
+          <p:nvSpPr>
+            <p:cNvPr id="20" name="Rectangle 19">
+              <a:extLst>
+                <a:ext uri="{FF2B5EF4-FFF2-40B4-BE49-F238E27FC236}">
+                  <a16:creationId xmlns:a16="http://schemas.microsoft.com/office/drawing/2014/main" id="{26987B05-1532-4F19-9C20-7D7C3A45E8B0}"/>
+                </a:ext>
+              </a:extLst>
+            </p:cNvPr>
+            <p:cNvSpPr/>
+            <p:nvPr/>
+          </p:nvSpPr>
+          <p:spPr>
+            <a:xfrm>
+              <a:off x="3968273" y="4341453"/>
+              <a:ext cx="2581275" cy="361951"/>
+            </a:xfrm>
+            <a:prstGeom prst="rect">
+              <a:avLst/>
+            </a:prstGeom>
+            <a:solidFill>
+              <a:schemeClr val="bg1"/>
+            </a:solidFill>
+            <a:ln w="25400" cap="flat" cmpd="sng" algn="ctr">
+              <a:solidFill>
+                <a:srgbClr val="4F81BD">
+                  <a:shade val="50000"/>
+                </a:srgbClr>
+              </a:solidFill>
+              <a:prstDash val="solid"/>
+            </a:ln>
+            <a:effectLst/>
+          </p:spPr>
+          <p:txBody>
+            <a:bodyPr rtlCol="0" anchor="ctr">
+              <a:normAutofit lnSpcReduction="10000"/>
+            </a:bodyPr>
+            <a:lstStyle/>
+            <a:p>
+              <a:pPr marL="0" marR="0" lvl="0" indent="0" algn="ctr" defTabSz="914400" eaLnBrk="1" fontAlgn="auto" latinLnBrk="0" hangingPunct="1">
+                <a:lnSpc>
+                  <a:spcPct val="100000"/>
+                </a:lnSpc>
+                <a:spcBef>
+                  <a:spcPts val="0"/>
+                </a:spcBef>
+                <a:spcAft>
+                  <a:spcPts val="0"/>
+                </a:spcAft>
+                <a:buClrTx/>
+                <a:buSzTx/>
+                <a:buFontTx/>
+                <a:buNone/>
+                <a:tabLst/>
+                <a:defRPr/>
+              </a:pPr>
+              <a:endParaRPr kumimoji="0" lang="en-US" sz="1800" b="0" i="0" u="none" strike="noStrike" kern="0" cap="none" spc="0" normalizeH="0" baseline="0" noProof="0" dirty="0">
+                <a:ln>
+                  <a:noFill/>
+                </a:ln>
+                <a:solidFill>
+                  <a:sysClr val="windowText" lastClr="000000"/>
+                </a:solidFill>
+                <a:effectLst/>
+                <a:uLnTx/>
+                <a:uFillTx/>
+                <a:latin typeface="Calibri"/>
+                <a:ea typeface="+mn-ea"/>
+                <a:cs typeface="+mn-cs"/>
+              </a:endParaRPr>
             </a:p>
           </p:txBody>
         </p:sp>

</xml_diff>